<commit_message>
Change of slides order V2
</commit_message>
<xml_diff>
--- a/Ordinal_Measure_for_Texture_V2.pptx
+++ b/Ordinal_Measure_for_Texture_V2.pptx
@@ -10,13 +10,13 @@
   <p:sldIdLst>
     <p:sldId id="256" r:id="rId2"/>
     <p:sldId id="267" r:id="rId3"/>
-    <p:sldId id="258" r:id="rId4"/>
-    <p:sldId id="299" r:id="rId5"/>
-    <p:sldId id="300" r:id="rId6"/>
-    <p:sldId id="303" r:id="rId7"/>
-    <p:sldId id="305" r:id="rId8"/>
-    <p:sldId id="304" r:id="rId9"/>
-    <p:sldId id="301" r:id="rId10"/>
+    <p:sldId id="314" r:id="rId4"/>
+    <p:sldId id="258" r:id="rId5"/>
+    <p:sldId id="299" r:id="rId6"/>
+    <p:sldId id="300" r:id="rId7"/>
+    <p:sldId id="303" r:id="rId8"/>
+    <p:sldId id="305" r:id="rId9"/>
+    <p:sldId id="304" r:id="rId10"/>
     <p:sldId id="306" r:id="rId11"/>
     <p:sldId id="313" r:id="rId12"/>
     <p:sldId id="308" r:id="rId13"/>
@@ -1105,7 +1105,7 @@
           <a:bodyPr/>
           <a:lstStyle/>
           <a:p>
-            <a:pPr marL="171450" lvl="0" indent="-171450">
+            <a:pPr marL="171450" indent="-171450">
               <a:buFont typeface="Arial" panose="020B0604020202020204" pitchFamily="34" charset="0"/>
               <a:buChar char="•"/>
             </a:pPr>
@@ -1119,20 +1119,14 @@
                 <a:ea typeface="+mn-ea"/>
                 <a:cs typeface="+mn-cs"/>
               </a:rPr>
-              <a:t>Firstly introduced by </a:t>
-            </a:r>
-            <a:r>
-              <a:rPr lang="en-GB" sz="1200" kern="1200" dirty="0" err="1">
-                <a:solidFill>
-                  <a:schemeClr val="tx1"/>
-                </a:solidFill>
-                <a:effectLst/>
-                <a:latin typeface="+mn-lt"/>
-                <a:ea typeface="+mn-ea"/>
-                <a:cs typeface="+mn-cs"/>
-              </a:rPr>
-              <a:t>Xiaofeng</a:t>
-            </a:r>
+              <a:t>Ordinal measure (OM) is defined as the relative ordering information of multiple variables</a:t>
+            </a:r>
+          </a:p>
+          <a:p>
+            <a:pPr marL="171450" indent="-171450">
+              <a:buFont typeface="Arial" panose="020B0604020202020204" pitchFamily="34" charset="0"/>
+              <a:buChar char="•"/>
+            </a:pPr>
             <a:r>
               <a:rPr lang="en-GB" sz="1200" kern="1200" dirty="0">
                 <a:solidFill>
@@ -1143,10 +1137,10 @@
                 <a:ea typeface="+mn-ea"/>
                 <a:cs typeface="+mn-cs"/>
               </a:rPr>
-              <a:t> Ren and </a:t>
-            </a:r>
-            <a:r>
-              <a:rPr lang="en-GB" sz="1200" kern="1200" dirty="0" err="1">
+              <a:t>For</a:t>
+            </a:r>
+            <a:r>
+              <a:rPr lang="en-GB" sz="1200" kern="1200" baseline="0" dirty="0">
                 <a:solidFill>
                   <a:schemeClr val="tx1"/>
                 </a:solidFill>
@@ -1155,7 +1149,7 @@
                 <a:ea typeface="+mn-ea"/>
                 <a:cs typeface="+mn-cs"/>
               </a:rPr>
-              <a:t>Jitendra</a:t>
+              <a:t> Intensity: </a:t>
             </a:r>
             <a:r>
               <a:rPr lang="en-GB" sz="1200" kern="1200" dirty="0">
@@ -1167,20 +1161,14 @@
                 <a:ea typeface="+mn-ea"/>
                 <a:cs typeface="+mn-cs"/>
               </a:rPr>
-              <a:t> Malik in their paper (but </a:t>
-            </a:r>
-            <a:r>
-              <a:rPr lang="en-GB" sz="1200" kern="1200" dirty="0" err="1">
-                <a:solidFill>
-                  <a:schemeClr val="tx1"/>
-                </a:solidFill>
-                <a:effectLst/>
-                <a:latin typeface="+mn-lt"/>
-                <a:ea typeface="+mn-ea"/>
-                <a:cs typeface="+mn-cs"/>
-              </a:rPr>
-              <a:t>superpixel</a:t>
-            </a:r>
+              <a:t>qualitative relationship between the average intensity values of two image regions </a:t>
+            </a:r>
+          </a:p>
+          <a:p>
+            <a:pPr marL="628650" lvl="1" indent="-171450">
+              <a:buFont typeface="Arial" panose="020B0604020202020204" pitchFamily="34" charset="0"/>
+              <a:buChar char="•"/>
+            </a:pPr>
             <a:r>
               <a:rPr lang="en-GB" sz="1200" kern="1200" dirty="0">
                 <a:solidFill>
@@ -1191,9 +1179,15 @@
                 <a:ea typeface="+mn-ea"/>
                 <a:cs typeface="+mn-cs"/>
               </a:rPr>
-              <a:t>-like segmentation was applied already before):</a:t>
-            </a:r>
-            <a:br>
+              <a:t>ordinal measure is “A&gt;B” and we can use one bit feature code “1” </a:t>
+            </a:r>
+          </a:p>
+          <a:p>
+            <a:pPr marL="171450" lvl="0" indent="-171450">
+              <a:buFont typeface="Arial" panose="020B0604020202020204" pitchFamily="34" charset="0"/>
+              <a:buChar char="•"/>
+            </a:pPr>
+            <a:r>
               <a:rPr lang="en-GB" sz="1200" kern="1200" dirty="0">
                 <a:solidFill>
                   <a:schemeClr val="tx1"/>
@@ -1203,75 +1197,14 @@
                 <a:ea typeface="+mn-ea"/>
                 <a:cs typeface="+mn-cs"/>
               </a:rPr>
-            </a:br>
-            <a:r>
-              <a:rPr lang="en-GB" sz="1200" kern="1200" dirty="0">
-                <a:solidFill>
-                  <a:schemeClr val="tx1"/>
-                </a:solidFill>
-                <a:effectLst/>
-                <a:latin typeface="+mn-lt"/>
-                <a:ea typeface="+mn-ea"/>
-                <a:cs typeface="+mn-cs"/>
-              </a:rPr>
-              <a:t>Learning a Classification Model for Segmentation</a:t>
-            </a:r>
-          </a:p>
-          <a:p>
-            <a:pPr marL="628650" lvl="1" indent="-171450">
+              <a:t>For Feature: qualitative information computed on the image features, e.g. Gabor features</a:t>
+            </a:r>
+          </a:p>
+          <a:p>
+            <a:pPr marL="171450" indent="-171450">
               <a:buFont typeface="Arial" panose="020B0604020202020204" pitchFamily="34" charset="0"/>
               <a:buChar char="•"/>
             </a:pPr>
-            <a:r>
-              <a:rPr lang="en-GB" sz="1200" kern="1200" dirty="0">
-                <a:solidFill>
-                  <a:schemeClr val="tx1"/>
-                </a:solidFill>
-                <a:effectLst/>
-                <a:latin typeface="+mn-lt"/>
-                <a:ea typeface="+mn-ea"/>
-                <a:cs typeface="+mn-cs"/>
-              </a:rPr>
-              <a:t>Goal: Classification model for Segmentation accuracy</a:t>
-            </a:r>
-          </a:p>
-          <a:p>
-            <a:pPr marL="628650" lvl="1" indent="-171450">
-              <a:buFont typeface="Arial" panose="020B0604020202020204" pitchFamily="34" charset="0"/>
-              <a:buChar char="•"/>
-            </a:pPr>
-            <a:r>
-              <a:rPr lang="en-GB" sz="1200" kern="1200" dirty="0">
-                <a:solidFill>
-                  <a:schemeClr val="tx1"/>
-                </a:solidFill>
-                <a:effectLst/>
-                <a:latin typeface="+mn-lt"/>
-                <a:ea typeface="+mn-ea"/>
-                <a:cs typeface="+mn-cs"/>
-              </a:rPr>
-              <a:t>Drew attention through good results and holding its promises	</a:t>
-            </a:r>
-          </a:p>
-          <a:p>
-            <a:pPr marL="171450" lvl="0" indent="-171450">
-              <a:buFont typeface="Arial" panose="020B0604020202020204" pitchFamily="34" charset="0"/>
-              <a:buChar char="•"/>
-            </a:pPr>
-            <a:r>
-              <a:rPr lang="en-GB" sz="1200" kern="1200" dirty="0">
-                <a:solidFill>
-                  <a:schemeClr val="tx1"/>
-                </a:solidFill>
-                <a:effectLst/>
-                <a:latin typeface="+mn-lt"/>
-                <a:ea typeface="+mn-ea"/>
-                <a:cs typeface="+mn-cs"/>
-              </a:rPr>
-              <a:t>First algorithms around 2009 </a:t>
-            </a:r>
-          </a:p>
-          <a:p>
             <a:endParaRPr lang="en-GB" dirty="0"/>
           </a:p>
         </p:txBody>
@@ -1302,7 +1235,7 @@
     </p:spTree>
     <p:extLst>
       <p:ext uri="{BB962C8B-B14F-4D97-AF65-F5344CB8AC3E}">
-        <p14:creationId xmlns:p14="http://schemas.microsoft.com/office/powerpoint/2010/main" val="3810489641"/>
+        <p14:creationId xmlns:p14="http://schemas.microsoft.com/office/powerpoint/2010/main" val="4007362349"/>
       </p:ext>
     </p:extLst>
   </p:cSld>
@@ -1386,7 +1319,7 @@
     </p:spTree>
     <p:extLst>
       <p:ext uri="{BB962C8B-B14F-4D97-AF65-F5344CB8AC3E}">
-        <p14:creationId xmlns:p14="http://schemas.microsoft.com/office/powerpoint/2010/main" val="2215252551"/>
+        <p14:creationId xmlns:p14="http://schemas.microsoft.com/office/powerpoint/2010/main" val="3810489641"/>
       </p:ext>
     </p:extLst>
   </p:cSld>
@@ -1470,7 +1403,7 @@
     </p:spTree>
     <p:extLst>
       <p:ext uri="{BB962C8B-B14F-4D97-AF65-F5344CB8AC3E}">
-        <p14:creationId xmlns:p14="http://schemas.microsoft.com/office/powerpoint/2010/main" val="3180425468"/>
+        <p14:creationId xmlns:p14="http://schemas.microsoft.com/office/powerpoint/2010/main" val="2215252551"/>
       </p:ext>
     </p:extLst>
   </p:cSld>
@@ -1554,7 +1487,7 @@
     </p:spTree>
     <p:extLst>
       <p:ext uri="{BB962C8B-B14F-4D97-AF65-F5344CB8AC3E}">
-        <p14:creationId xmlns:p14="http://schemas.microsoft.com/office/powerpoint/2010/main" val="939238731"/>
+        <p14:creationId xmlns:p14="http://schemas.microsoft.com/office/powerpoint/2010/main" val="3180425468"/>
       </p:ext>
     </p:extLst>
   </p:cSld>
@@ -1638,7 +1571,7 @@
     </p:spTree>
     <p:extLst>
       <p:ext uri="{BB962C8B-B14F-4D97-AF65-F5344CB8AC3E}">
-        <p14:creationId xmlns:p14="http://schemas.microsoft.com/office/powerpoint/2010/main" val="789811708"/>
+        <p14:creationId xmlns:p14="http://schemas.microsoft.com/office/powerpoint/2010/main" val="939238731"/>
       </p:ext>
     </p:extLst>
   </p:cSld>
@@ -1722,7 +1655,7 @@
     </p:spTree>
     <p:extLst>
       <p:ext uri="{BB962C8B-B14F-4D97-AF65-F5344CB8AC3E}">
-        <p14:creationId xmlns:p14="http://schemas.microsoft.com/office/powerpoint/2010/main" val="2538963957"/>
+        <p14:creationId xmlns:p14="http://schemas.microsoft.com/office/powerpoint/2010/main" val="789811708"/>
       </p:ext>
     </p:extLst>
   </p:cSld>
@@ -1776,106 +1709,6 @@
           <a:bodyPr/>
           <a:lstStyle/>
           <a:p>
-            <a:pPr marL="171450" indent="-171450">
-              <a:buFont typeface="Arial" panose="020B0604020202020204" pitchFamily="34" charset="0"/>
-              <a:buChar char="•"/>
-            </a:pPr>
-            <a:r>
-              <a:rPr lang="en-GB" sz="1200" kern="1200" dirty="0">
-                <a:solidFill>
-                  <a:schemeClr val="tx1"/>
-                </a:solidFill>
-                <a:effectLst/>
-                <a:latin typeface="+mn-lt"/>
-                <a:ea typeface="+mn-ea"/>
-                <a:cs typeface="+mn-cs"/>
-              </a:rPr>
-              <a:t>Ordinal measure (OM) is defined as the relative ordering information of multiple variables</a:t>
-            </a:r>
-          </a:p>
-          <a:p>
-            <a:pPr marL="171450" indent="-171450">
-              <a:buFont typeface="Arial" panose="020B0604020202020204" pitchFamily="34" charset="0"/>
-              <a:buChar char="•"/>
-            </a:pPr>
-            <a:r>
-              <a:rPr lang="en-GB" sz="1200" kern="1200" dirty="0">
-                <a:solidFill>
-                  <a:schemeClr val="tx1"/>
-                </a:solidFill>
-                <a:effectLst/>
-                <a:latin typeface="+mn-lt"/>
-                <a:ea typeface="+mn-ea"/>
-                <a:cs typeface="+mn-cs"/>
-              </a:rPr>
-              <a:t>For</a:t>
-            </a:r>
-            <a:r>
-              <a:rPr lang="en-GB" sz="1200" kern="1200" baseline="0" dirty="0">
-                <a:solidFill>
-                  <a:schemeClr val="tx1"/>
-                </a:solidFill>
-                <a:effectLst/>
-                <a:latin typeface="+mn-lt"/>
-                <a:ea typeface="+mn-ea"/>
-                <a:cs typeface="+mn-cs"/>
-              </a:rPr>
-              <a:t> Intensity: </a:t>
-            </a:r>
-            <a:r>
-              <a:rPr lang="en-GB" sz="1200" kern="1200" dirty="0">
-                <a:solidFill>
-                  <a:schemeClr val="tx1"/>
-                </a:solidFill>
-                <a:effectLst/>
-                <a:latin typeface="+mn-lt"/>
-                <a:ea typeface="+mn-ea"/>
-                <a:cs typeface="+mn-cs"/>
-              </a:rPr>
-              <a:t>qualitative relationship between the average intensity values of two image regions </a:t>
-            </a:r>
-          </a:p>
-          <a:p>
-            <a:pPr marL="628650" lvl="1" indent="-171450">
-              <a:buFont typeface="Arial" panose="020B0604020202020204" pitchFamily="34" charset="0"/>
-              <a:buChar char="•"/>
-            </a:pPr>
-            <a:r>
-              <a:rPr lang="en-GB" sz="1200" kern="1200" dirty="0">
-                <a:solidFill>
-                  <a:schemeClr val="tx1"/>
-                </a:solidFill>
-                <a:effectLst/>
-                <a:latin typeface="+mn-lt"/>
-                <a:ea typeface="+mn-ea"/>
-                <a:cs typeface="+mn-cs"/>
-              </a:rPr>
-              <a:t>ordinal measure is “A&gt;B” and we can use one bit feature code “1” </a:t>
-            </a:r>
-          </a:p>
-          <a:p>
-            <a:pPr marL="171450" lvl="0" indent="-171450">
-              <a:buFont typeface="Arial" panose="020B0604020202020204" pitchFamily="34" charset="0"/>
-              <a:buChar char="•"/>
-            </a:pPr>
-            <a:r>
-              <a:rPr lang="en-GB" sz="1200" kern="1200" dirty="0">
-                <a:solidFill>
-                  <a:schemeClr val="tx1"/>
-                </a:solidFill>
-                <a:effectLst/>
-                <a:latin typeface="+mn-lt"/>
-                <a:ea typeface="+mn-ea"/>
-                <a:cs typeface="+mn-cs"/>
-              </a:rPr>
-              <a:t>For Feature: qualitative information computed on the image features, e.g. Gabor features</a:t>
-            </a:r>
-          </a:p>
-          <a:p>
-            <a:pPr marL="171450" indent="-171450">
-              <a:buFont typeface="Arial" panose="020B0604020202020204" pitchFamily="34" charset="0"/>
-              <a:buChar char="•"/>
-            </a:pPr>
             <a:endParaRPr lang="en-GB" dirty="0"/>
           </a:p>
         </p:txBody>
@@ -1906,7 +1739,7 @@
     </p:spTree>
     <p:extLst>
       <p:ext uri="{BB962C8B-B14F-4D97-AF65-F5344CB8AC3E}">
-        <p14:creationId xmlns:p14="http://schemas.microsoft.com/office/powerpoint/2010/main" val="2279872559"/>
+        <p14:creationId xmlns:p14="http://schemas.microsoft.com/office/powerpoint/2010/main" val="2538963957"/>
       </p:ext>
     </p:extLst>
   </p:cSld>
@@ -5695,7 +5528,6 @@
               <a:rPr lang="en-US" dirty="0"/>
               <a:t>Ordinal Measures</a:t>
             </a:r>
-            <a:endParaRPr lang="en-US" dirty="0"/>
           </a:p>
         </p:txBody>
       </p:sp>
@@ -10442,25 +10274,17 @@
           </a:lstStyle>
           <a:p>
             <a:r>
-              <a:rPr lang="en-GB" dirty="0"/>
+              <a:rPr lang="en-GB" dirty="0" smtClean="0"/>
               <a:t>Introduction</a:t>
             </a:r>
+            <a:endParaRPr lang="en-GB" dirty="0"/>
           </a:p>
           <a:p>
             <a:r>
               <a:rPr lang="en-GB" dirty="0" smtClean="0"/>
-              <a:t>Applications </a:t>
-            </a:r>
-            <a:r>
-              <a:rPr lang="en-GB" dirty="0"/>
-              <a:t>in Biometrics</a:t>
-            </a:r>
-          </a:p>
-          <a:p>
-            <a:r>
-              <a:rPr lang="en-GB" dirty="0"/>
               <a:t>Demonstration</a:t>
             </a:r>
+            <a:endParaRPr lang="en-GB" dirty="0"/>
           </a:p>
           <a:p>
             <a:r>
@@ -10489,7 +10313,12 @@
               <a:rPr lang="en-GB" dirty="0" smtClean="0"/>
               <a:t>Mathematical background</a:t>
             </a:r>
-            <a:endParaRPr lang="en-GB" dirty="0"/>
+          </a:p>
+          <a:p>
+            <a:r>
+              <a:rPr lang="en-GB" dirty="0" smtClean="0"/>
+              <a:t>Applications</a:t>
+            </a:r>
           </a:p>
         </p:txBody>
       </p:sp>
@@ -10542,7 +10371,7 @@
           <a:p>
             <a:r>
               <a:rPr lang="en-GB" dirty="0"/>
-              <a:t>Introduction</a:t>
+              <a:t>Definition</a:t>
             </a:r>
           </a:p>
         </p:txBody>
@@ -10615,71 +10444,9 @@
           </a:p>
         </p:txBody>
       </p:sp>
-      <p:pic>
-        <p:nvPicPr>
-          <p:cNvPr id="7" name="Grafik 6"/>
-          <p:cNvPicPr>
-            <a:picLocks noChangeAspect="1"/>
-          </p:cNvPicPr>
-          <p:nvPr/>
-        </p:nvPicPr>
-        <p:blipFill rotWithShape="1">
-          <a:blip r:embed="rId3"/>
-          <a:srcRect r="40002"/>
-          <a:stretch/>
-        </p:blipFill>
-        <p:spPr>
-          <a:xfrm>
-            <a:off x="628650" y="1962520"/>
-            <a:ext cx="3588159" cy="3564000"/>
-          </a:xfrm>
-          <a:prstGeom prst="rect">
-            <a:avLst/>
-          </a:prstGeom>
-        </p:spPr>
-      </p:pic>
-      <p:pic>
-        <p:nvPicPr>
-          <p:cNvPr id="8" name="Grafik 7"/>
-          <p:cNvPicPr>
-            <a:picLocks noChangeAspect="1"/>
-          </p:cNvPicPr>
-          <p:nvPr/>
-        </p:nvPicPr>
-        <p:blipFill>
-          <a:blip r:embed="rId4" cstate="print">
-            <a:extLst>
-              <a:ext uri="{BEBA8EAE-BF5A-486C-A8C5-ECC9F3942E4B}">
-                <a14:imgProps xmlns:a14="http://schemas.microsoft.com/office/drawing/2010/main">
-                  <a14:imgLayer r:embed="rId5">
-                    <a14:imgEffect>
-                      <a14:saturation sat="0"/>
-                    </a14:imgEffect>
-                  </a14:imgLayer>
-                </a14:imgProps>
-              </a:ext>
-              <a:ext uri="{28A0092B-C50C-407E-A947-70E740481C1C}">
-                <a14:useLocalDpi xmlns:a14="http://schemas.microsoft.com/office/drawing/2010/main" val="0"/>
-              </a:ext>
-            </a:extLst>
-          </a:blip>
-          <a:stretch>
-            <a:fillRect/>
-          </a:stretch>
-        </p:blipFill>
-        <p:spPr>
-          <a:xfrm>
-            <a:off x="4316809" y="1962520"/>
-            <a:ext cx="4198541" cy="3564000"/>
-          </a:xfrm>
-          <a:prstGeom prst="rect">
-            <a:avLst/>
-          </a:prstGeom>
-        </p:spPr>
-      </p:pic>
-      <p:sp>
-        <p:nvSpPr>
-          <p:cNvPr id="10" name="Inhaltsplatzhalter 2"/>
+      <p:sp>
+        <p:nvSpPr>
+          <p:cNvPr id="7" name="Inhaltsplatzhalter 2"/>
           <p:cNvSpPr txBox="1">
             <a:spLocks/>
           </p:cNvSpPr>
@@ -10878,21 +10645,92 @@
             </a:lvl9pPr>
           </a:lstStyle>
           <a:p>
-            <a:pPr marL="0" indent="0">
-              <a:buNone/>
-            </a:pPr>
             <a:r>
               <a:rPr lang="en-GB" dirty="0"/>
-              <a:t>Texture as descriptor</a:t>
-            </a:r>
+              <a:t>Ordinal Measures (OM)</a:t>
+            </a:r>
+          </a:p>
+          <a:p>
+            <a:pPr lvl="1"/>
+            <a:r>
+              <a:rPr lang="en-GB" dirty="0"/>
+              <a:t>Relative ordering of variables</a:t>
+            </a:r>
+          </a:p>
+          <a:p>
+            <a:pPr lvl="1"/>
+            <a:r>
+              <a:rPr lang="en-GB" dirty="0"/>
+              <a:t>For intensity or feature level</a:t>
+            </a:r>
+            <a:br>
+              <a:rPr lang="en-GB" dirty="0"/>
+            </a:br>
+            <a:r>
+              <a:rPr lang="en-GB" dirty="0"/>
+              <a:t>(Gabor features)</a:t>
+            </a:r>
+            <a:br>
+              <a:rPr lang="en-GB" dirty="0"/>
+            </a:br>
             <a:endParaRPr lang="en-GB" dirty="0"/>
           </a:p>
-        </p:txBody>
-      </p:sp>
+          <a:p>
+            <a:r>
+              <a:rPr lang="en-GB" dirty="0"/>
+              <a:t>Advantages in computer vision:</a:t>
+            </a:r>
+          </a:p>
+          <a:p>
+            <a:pPr lvl="1"/>
+            <a:r>
+              <a:rPr lang="en-GB" dirty="0"/>
+              <a:t>Invariance to monotonic illumination changes </a:t>
+            </a:r>
+          </a:p>
+          <a:p>
+            <a:pPr lvl="1"/>
+            <a:r>
+              <a:rPr lang="en-GB" dirty="0"/>
+              <a:t>Robustness against noise</a:t>
+            </a:r>
+          </a:p>
+          <a:p>
+            <a:pPr lvl="1"/>
+            <a:r>
+              <a:rPr lang="en-GB" dirty="0"/>
+              <a:t>Useful for recognition tasks</a:t>
+            </a:r>
+          </a:p>
+        </p:txBody>
+      </p:sp>
+      <p:pic>
+        <p:nvPicPr>
+          <p:cNvPr id="3" name="Grafik 2"/>
+          <p:cNvPicPr>
+            <a:picLocks noChangeAspect="1"/>
+          </p:cNvPicPr>
+          <p:nvPr/>
+        </p:nvPicPr>
+        <p:blipFill rotWithShape="1">
+          <a:blip r:embed="rId3"/>
+          <a:srcRect l="14121" t="6946" r="10566" b="4244"/>
+          <a:stretch/>
+        </p:blipFill>
+        <p:spPr>
+          <a:xfrm>
+            <a:off x="5557520" y="914399"/>
+            <a:ext cx="2957830" cy="2584209"/>
+          </a:xfrm>
+          <a:prstGeom prst="rect">
+            <a:avLst/>
+          </a:prstGeom>
+        </p:spPr>
+      </p:pic>
     </p:spTree>
     <p:extLst>
       <p:ext uri="{BB962C8B-B14F-4D97-AF65-F5344CB8AC3E}">
-        <p14:creationId xmlns:p14="http://schemas.microsoft.com/office/powerpoint/2010/main" val="1605804049"/>
+        <p14:creationId xmlns:p14="http://schemas.microsoft.com/office/powerpoint/2010/main" val="3832142688"/>
       </p:ext>
     </p:extLst>
   </p:cSld>
@@ -10938,7 +10776,7 @@
           <a:p>
             <a:r>
               <a:rPr lang="en-GB" dirty="0"/>
-              <a:t>Demonstration</a:t>
+              <a:t>Introduction</a:t>
             </a:r>
           </a:p>
         </p:txBody>
@@ -11006,6 +10844,401 @@
             <a:fld id="{FB9D3F8E-99BC-4812-95D4-548B8E992B94}" type="slidenum">
               <a:rPr lang="en-GB" smtClean="0"/>
               <a:t>4</a:t>
+            </a:fld>
+            <a:endParaRPr lang="en-GB"/>
+          </a:p>
+        </p:txBody>
+      </p:sp>
+      <p:pic>
+        <p:nvPicPr>
+          <p:cNvPr id="7" name="Grafik 6"/>
+          <p:cNvPicPr>
+            <a:picLocks noChangeAspect="1"/>
+          </p:cNvPicPr>
+          <p:nvPr/>
+        </p:nvPicPr>
+        <p:blipFill rotWithShape="1">
+          <a:blip r:embed="rId3"/>
+          <a:srcRect r="40002"/>
+          <a:stretch/>
+        </p:blipFill>
+        <p:spPr>
+          <a:xfrm>
+            <a:off x="628650" y="1962520"/>
+            <a:ext cx="3588159" cy="3564000"/>
+          </a:xfrm>
+          <a:prstGeom prst="rect">
+            <a:avLst/>
+          </a:prstGeom>
+        </p:spPr>
+      </p:pic>
+      <p:pic>
+        <p:nvPicPr>
+          <p:cNvPr id="8" name="Grafik 7"/>
+          <p:cNvPicPr>
+            <a:picLocks noChangeAspect="1"/>
+          </p:cNvPicPr>
+          <p:nvPr/>
+        </p:nvPicPr>
+        <p:blipFill>
+          <a:blip r:embed="rId4" cstate="print">
+            <a:extLst>
+              <a:ext uri="{BEBA8EAE-BF5A-486C-A8C5-ECC9F3942E4B}">
+                <a14:imgProps xmlns:a14="http://schemas.microsoft.com/office/drawing/2010/main">
+                  <a14:imgLayer r:embed="rId5">
+                    <a14:imgEffect>
+                      <a14:saturation sat="0"/>
+                    </a14:imgEffect>
+                  </a14:imgLayer>
+                </a14:imgProps>
+              </a:ext>
+              <a:ext uri="{28A0092B-C50C-407E-A947-70E740481C1C}">
+                <a14:useLocalDpi xmlns:a14="http://schemas.microsoft.com/office/drawing/2010/main" val="0"/>
+              </a:ext>
+            </a:extLst>
+          </a:blip>
+          <a:stretch>
+            <a:fillRect/>
+          </a:stretch>
+        </p:blipFill>
+        <p:spPr>
+          <a:xfrm>
+            <a:off x="4316809" y="1962520"/>
+            <a:ext cx="4198541" cy="3564000"/>
+          </a:xfrm>
+          <a:prstGeom prst="rect">
+            <a:avLst/>
+          </a:prstGeom>
+        </p:spPr>
+      </p:pic>
+      <p:sp>
+        <p:nvSpPr>
+          <p:cNvPr id="10" name="Inhaltsplatzhalter 2"/>
+          <p:cNvSpPr txBox="1">
+            <a:spLocks/>
+          </p:cNvSpPr>
+          <p:nvPr/>
+        </p:nvSpPr>
+        <p:spPr>
+          <a:xfrm>
+            <a:off x="628650" y="1213872"/>
+            <a:ext cx="7886700" cy="4645152"/>
+          </a:xfrm>
+          <a:prstGeom prst="rect">
+            <a:avLst/>
+          </a:prstGeom>
+        </p:spPr>
+        <p:txBody>
+          <a:bodyPr vert="horz" lIns="91440" tIns="45720" rIns="91440" bIns="45720" rtlCol="0">
+            <a:normAutofit/>
+          </a:bodyPr>
+          <a:lstStyle>
+            <a:lvl1pPr marL="228600" indent="-228600" algn="l" defTabSz="914400" rtl="0" eaLnBrk="1" latinLnBrk="0" hangingPunct="1">
+              <a:lnSpc>
+                <a:spcPct val="90000"/>
+              </a:lnSpc>
+              <a:spcBef>
+                <a:spcPts val="1000"/>
+              </a:spcBef>
+              <a:spcAft>
+                <a:spcPts val="600"/>
+              </a:spcAft>
+              <a:buFont typeface="Arial" panose="020B0604020202020204" pitchFamily="34" charset="0"/>
+              <a:buChar char="•"/>
+              <a:defRPr sz="2800" kern="1200">
+                <a:solidFill>
+                  <a:schemeClr val="tx1"/>
+                </a:solidFill>
+                <a:latin typeface="+mn-lt"/>
+                <a:ea typeface="+mn-ea"/>
+                <a:cs typeface="+mn-cs"/>
+              </a:defRPr>
+            </a:lvl1pPr>
+            <a:lvl2pPr marL="685800" indent="-228600" algn="l" defTabSz="914400" rtl="0" eaLnBrk="1" latinLnBrk="0" hangingPunct="1">
+              <a:lnSpc>
+                <a:spcPct val="90000"/>
+              </a:lnSpc>
+              <a:spcBef>
+                <a:spcPts val="500"/>
+              </a:spcBef>
+              <a:spcAft>
+                <a:spcPts val="0"/>
+              </a:spcAft>
+              <a:buFont typeface="Arial" panose="020B0604020202020204" pitchFamily="34" charset="0"/>
+              <a:buChar char="•"/>
+              <a:defRPr sz="2400" kern="1200">
+                <a:solidFill>
+                  <a:schemeClr val="tx1"/>
+                </a:solidFill>
+                <a:latin typeface="+mn-lt"/>
+                <a:ea typeface="+mn-ea"/>
+                <a:cs typeface="+mn-cs"/>
+              </a:defRPr>
+            </a:lvl2pPr>
+            <a:lvl3pPr marL="1143000" indent="-228600" algn="l" defTabSz="914400" rtl="0" eaLnBrk="1" latinLnBrk="0" hangingPunct="1">
+              <a:lnSpc>
+                <a:spcPct val="90000"/>
+              </a:lnSpc>
+              <a:spcBef>
+                <a:spcPts val="500"/>
+              </a:spcBef>
+              <a:spcAft>
+                <a:spcPts val="0"/>
+              </a:spcAft>
+              <a:buFont typeface="Arial" panose="020B0604020202020204" pitchFamily="34" charset="0"/>
+              <a:buChar char="•"/>
+              <a:defRPr sz="2000" kern="1200">
+                <a:solidFill>
+                  <a:schemeClr val="tx1"/>
+                </a:solidFill>
+                <a:latin typeface="+mn-lt"/>
+                <a:ea typeface="+mn-ea"/>
+                <a:cs typeface="+mn-cs"/>
+              </a:defRPr>
+            </a:lvl3pPr>
+            <a:lvl4pPr marL="1600200" indent="-228600" algn="l" defTabSz="914400" rtl="0" eaLnBrk="1" latinLnBrk="0" hangingPunct="1">
+              <a:lnSpc>
+                <a:spcPct val="90000"/>
+              </a:lnSpc>
+              <a:spcBef>
+                <a:spcPts val="500"/>
+              </a:spcBef>
+              <a:spcAft>
+                <a:spcPts val="0"/>
+              </a:spcAft>
+              <a:buFont typeface="Arial" panose="020B0604020202020204" pitchFamily="34" charset="0"/>
+              <a:buChar char="•"/>
+              <a:defRPr sz="1800" kern="1200">
+                <a:solidFill>
+                  <a:schemeClr val="tx1"/>
+                </a:solidFill>
+                <a:latin typeface="+mn-lt"/>
+                <a:ea typeface="+mn-ea"/>
+                <a:cs typeface="+mn-cs"/>
+              </a:defRPr>
+            </a:lvl4pPr>
+            <a:lvl5pPr marL="2057400" indent="-228600" algn="l" defTabSz="914400" rtl="0" eaLnBrk="1" latinLnBrk="0" hangingPunct="1">
+              <a:lnSpc>
+                <a:spcPct val="90000"/>
+              </a:lnSpc>
+              <a:spcBef>
+                <a:spcPts val="500"/>
+              </a:spcBef>
+              <a:spcAft>
+                <a:spcPts val="0"/>
+              </a:spcAft>
+              <a:buFont typeface="Arial" panose="020B0604020202020204" pitchFamily="34" charset="0"/>
+              <a:buChar char="•"/>
+              <a:defRPr sz="1800" kern="1200">
+                <a:solidFill>
+                  <a:schemeClr val="tx1"/>
+                </a:solidFill>
+                <a:latin typeface="+mn-lt"/>
+                <a:ea typeface="+mn-ea"/>
+                <a:cs typeface="+mn-cs"/>
+              </a:defRPr>
+            </a:lvl5pPr>
+            <a:lvl6pPr marL="2514600" indent="-228600" algn="l" defTabSz="914400" rtl="0" eaLnBrk="1" latinLnBrk="0" hangingPunct="1">
+              <a:lnSpc>
+                <a:spcPct val="90000"/>
+              </a:lnSpc>
+              <a:spcBef>
+                <a:spcPts val="500"/>
+              </a:spcBef>
+              <a:buFont typeface="Arial" panose="020B0604020202020204" pitchFamily="34" charset="0"/>
+              <a:buChar char="•"/>
+              <a:defRPr sz="1800" kern="1200">
+                <a:solidFill>
+                  <a:schemeClr val="tx1"/>
+                </a:solidFill>
+                <a:latin typeface="+mn-lt"/>
+                <a:ea typeface="+mn-ea"/>
+                <a:cs typeface="+mn-cs"/>
+              </a:defRPr>
+            </a:lvl6pPr>
+            <a:lvl7pPr marL="2971800" indent="-228600" algn="l" defTabSz="914400" rtl="0" eaLnBrk="1" latinLnBrk="0" hangingPunct="1">
+              <a:lnSpc>
+                <a:spcPct val="90000"/>
+              </a:lnSpc>
+              <a:spcBef>
+                <a:spcPts val="500"/>
+              </a:spcBef>
+              <a:buFont typeface="Arial" panose="020B0604020202020204" pitchFamily="34" charset="0"/>
+              <a:buChar char="•"/>
+              <a:defRPr sz="1800" kern="1200">
+                <a:solidFill>
+                  <a:schemeClr val="tx1"/>
+                </a:solidFill>
+                <a:latin typeface="+mn-lt"/>
+                <a:ea typeface="+mn-ea"/>
+                <a:cs typeface="+mn-cs"/>
+              </a:defRPr>
+            </a:lvl7pPr>
+            <a:lvl8pPr marL="3429000" indent="-228600" algn="l" defTabSz="914400" rtl="0" eaLnBrk="1" latinLnBrk="0" hangingPunct="1">
+              <a:lnSpc>
+                <a:spcPct val="90000"/>
+              </a:lnSpc>
+              <a:spcBef>
+                <a:spcPts val="500"/>
+              </a:spcBef>
+              <a:buFont typeface="Arial" panose="020B0604020202020204" pitchFamily="34" charset="0"/>
+              <a:buChar char="•"/>
+              <a:defRPr sz="1800" kern="1200">
+                <a:solidFill>
+                  <a:schemeClr val="tx1"/>
+                </a:solidFill>
+                <a:latin typeface="+mn-lt"/>
+                <a:ea typeface="+mn-ea"/>
+                <a:cs typeface="+mn-cs"/>
+              </a:defRPr>
+            </a:lvl8pPr>
+            <a:lvl9pPr marL="3886200" indent="-228600" algn="l" defTabSz="914400" rtl="0" eaLnBrk="1" latinLnBrk="0" hangingPunct="1">
+              <a:lnSpc>
+                <a:spcPct val="90000"/>
+              </a:lnSpc>
+              <a:spcBef>
+                <a:spcPts val="500"/>
+              </a:spcBef>
+              <a:buFont typeface="Arial" panose="020B0604020202020204" pitchFamily="34" charset="0"/>
+              <a:buChar char="•"/>
+              <a:defRPr sz="1800" kern="1200">
+                <a:solidFill>
+                  <a:schemeClr val="tx1"/>
+                </a:solidFill>
+                <a:latin typeface="+mn-lt"/>
+                <a:ea typeface="+mn-ea"/>
+                <a:cs typeface="+mn-cs"/>
+              </a:defRPr>
+            </a:lvl9pPr>
+          </a:lstStyle>
+          <a:p>
+            <a:pPr marL="0" indent="0">
+              <a:buNone/>
+            </a:pPr>
+            <a:r>
+              <a:rPr lang="en-GB" dirty="0"/>
+              <a:t>Texture as descriptor</a:t>
+            </a:r>
+          </a:p>
+        </p:txBody>
+      </p:sp>
+    </p:spTree>
+    <p:extLst>
+      <p:ext uri="{BB962C8B-B14F-4D97-AF65-F5344CB8AC3E}">
+        <p14:creationId xmlns:p14="http://schemas.microsoft.com/office/powerpoint/2010/main" val="1605804049"/>
+      </p:ext>
+    </p:extLst>
+  </p:cSld>
+  <p:clrMapOvr>
+    <a:masterClrMapping/>
+  </p:clrMapOvr>
+</p:sld>
+</file>
+
+<file path=ppt/slides/slide5.xml><?xml version="1.0" encoding="utf-8"?>
+<p:sld xmlns:a="http://schemas.openxmlformats.org/drawingml/2006/main" xmlns:r="http://schemas.openxmlformats.org/officeDocument/2006/relationships" xmlns:p="http://schemas.openxmlformats.org/presentationml/2006/main">
+  <p:cSld>
+    <p:spTree>
+      <p:nvGrpSpPr>
+        <p:cNvPr id="1" name=""/>
+        <p:cNvGrpSpPr/>
+        <p:nvPr/>
+      </p:nvGrpSpPr>
+      <p:grpSpPr>
+        <a:xfrm>
+          <a:off x="0" y="0"/>
+          <a:ext cx="0" cy="0"/>
+          <a:chOff x="0" y="0"/>
+          <a:chExt cx="0" cy="0"/>
+        </a:xfrm>
+      </p:grpSpPr>
+      <p:sp>
+        <p:nvSpPr>
+          <p:cNvPr id="2" name="Titel 1"/>
+          <p:cNvSpPr>
+            <a:spLocks noGrp="1"/>
+          </p:cNvSpPr>
+          <p:nvPr>
+            <p:ph type="title"/>
+          </p:nvPr>
+        </p:nvSpPr>
+        <p:spPr/>
+        <p:txBody>
+          <a:bodyPr>
+            <a:normAutofit/>
+          </a:bodyPr>
+          <a:lstStyle/>
+          <a:p>
+            <a:r>
+              <a:rPr lang="en-GB" dirty="0"/>
+              <a:t>Demonstration</a:t>
+            </a:r>
+          </a:p>
+        </p:txBody>
+      </p:sp>
+      <p:sp>
+        <p:nvSpPr>
+          <p:cNvPr id="4" name="Datumsplatzhalter 3"/>
+          <p:cNvSpPr>
+            <a:spLocks noGrp="1"/>
+          </p:cNvSpPr>
+          <p:nvPr>
+            <p:ph type="dt" sz="half" idx="10"/>
+          </p:nvPr>
+        </p:nvSpPr>
+        <p:spPr/>
+        <p:txBody>
+          <a:bodyPr/>
+          <a:lstStyle/>
+          <a:p>
+            <a:r>
+              <a:rPr lang="en-US"/>
+              <a:t>Ganiyu Ibraheem   Philipp Seybold </a:t>
+            </a:r>
+            <a:endParaRPr lang="en-GB" dirty="0"/>
+          </a:p>
+        </p:txBody>
+      </p:sp>
+      <p:sp>
+        <p:nvSpPr>
+          <p:cNvPr id="5" name="Fußzeilenplatzhalter 4"/>
+          <p:cNvSpPr>
+            <a:spLocks noGrp="1"/>
+          </p:cNvSpPr>
+          <p:nvPr>
+            <p:ph type="ftr" sz="quarter" idx="11"/>
+          </p:nvPr>
+        </p:nvSpPr>
+        <p:spPr/>
+        <p:txBody>
+          <a:bodyPr/>
+          <a:lstStyle/>
+          <a:p>
+            <a:r>
+              <a:rPr lang="en-GB"/>
+              <a:t>COMP6206 Advanced Computer Vision</a:t>
+            </a:r>
+          </a:p>
+        </p:txBody>
+      </p:sp>
+      <p:sp>
+        <p:nvSpPr>
+          <p:cNvPr id="6" name="Foliennummernplatzhalter 5"/>
+          <p:cNvSpPr>
+            <a:spLocks noGrp="1"/>
+          </p:cNvSpPr>
+          <p:nvPr>
+            <p:ph type="sldNum" sz="quarter" idx="12"/>
+          </p:nvPr>
+        </p:nvSpPr>
+        <p:spPr/>
+        <p:txBody>
+          <a:bodyPr/>
+          <a:lstStyle/>
+          <a:p>
+            <a:fld id="{FB9D3F8E-99BC-4812-95D4-548B8E992B94}" type="slidenum">
+              <a:rPr lang="en-GB" smtClean="0"/>
+              <a:t>5</a:t>
             </a:fld>
             <a:endParaRPr lang="en-GB"/>
           </a:p>
@@ -11438,7 +11671,7 @@
 </p:sld>
 </file>
 
-<file path=ppt/slides/slide5.xml><?xml version="1.0" encoding="utf-8"?>
+<file path=ppt/slides/slide6.xml><?xml version="1.0" encoding="utf-8"?>
 <p:sld xmlns:a="http://schemas.openxmlformats.org/drawingml/2006/main" xmlns:r="http://schemas.openxmlformats.org/officeDocument/2006/relationships" xmlns:p="http://schemas.openxmlformats.org/presentationml/2006/main">
   <p:cSld>
     <p:spTree>
@@ -11541,7 +11774,7 @@
           <a:p>
             <a:fld id="{FB9D3F8E-99BC-4812-95D4-548B8E992B94}" type="slidenum">
               <a:rPr lang="en-GB" smtClean="0"/>
-              <a:t>5</a:t>
+              <a:t>6</a:t>
             </a:fld>
             <a:endParaRPr lang="en-GB"/>
           </a:p>
@@ -11770,7 +12003,7 @@
 </p:sld>
 </file>
 
-<file path=ppt/slides/slide6.xml><?xml version="1.0" encoding="utf-8"?>
+<file path=ppt/slides/slide7.xml><?xml version="1.0" encoding="utf-8"?>
 <p:sld xmlns:a="http://schemas.openxmlformats.org/drawingml/2006/main" xmlns:r="http://schemas.openxmlformats.org/officeDocument/2006/relationships" xmlns:p="http://schemas.openxmlformats.org/presentationml/2006/main">
   <p:cSld>
     <p:spTree>
@@ -11962,7 +12195,7 @@
           <a:p>
             <a:fld id="{FB9D3F8E-99BC-4812-95D4-548B8E992B94}" type="slidenum">
               <a:rPr lang="en-GB" smtClean="0"/>
-              <a:t>6</a:t>
+              <a:t>7</a:t>
             </a:fld>
             <a:endParaRPr lang="en-GB"/>
           </a:p>
@@ -12315,7 +12548,7 @@
 </p:sld>
 </file>
 
-<file path=ppt/slides/slide7.xml><?xml version="1.0" encoding="utf-8"?>
+<file path=ppt/slides/slide8.xml><?xml version="1.0" encoding="utf-8"?>
 <p:sld xmlns:a="http://schemas.openxmlformats.org/drawingml/2006/main" xmlns:r="http://schemas.openxmlformats.org/officeDocument/2006/relationships" xmlns:p="http://schemas.openxmlformats.org/presentationml/2006/main">
   <p:cSld>
     <p:spTree>
@@ -12507,7 +12740,7 @@
           <a:p>
             <a:fld id="{FB9D3F8E-99BC-4812-95D4-548B8E992B94}" type="slidenum">
               <a:rPr lang="en-GB" smtClean="0"/>
-              <a:t>7</a:t>
+              <a:t>8</a:t>
             </a:fld>
             <a:endParaRPr lang="en-GB"/>
           </a:p>
@@ -12948,7 +13181,7 @@
 </p:sld>
 </file>
 
-<file path=ppt/slides/slide8.xml><?xml version="1.0" encoding="utf-8"?>
+<file path=ppt/slides/slide9.xml><?xml version="1.0" encoding="utf-8"?>
 <p:sld xmlns:a="http://schemas.openxmlformats.org/drawingml/2006/main" xmlns:r="http://schemas.openxmlformats.org/officeDocument/2006/relationships" xmlns:p="http://schemas.openxmlformats.org/presentationml/2006/main">
   <p:cSld>
     <p:spTree>
@@ -13051,7 +13284,7 @@
           <a:p>
             <a:fld id="{FB9D3F8E-99BC-4812-95D4-548B8E992B94}" type="slidenum">
               <a:rPr lang="en-GB" smtClean="0"/>
-              <a:t>8</a:t>
+              <a:t>9</a:t>
             </a:fld>
             <a:endParaRPr lang="en-GB"/>
           </a:p>
@@ -13399,411 +13632,6 @@
     <p:extLst>
       <p:ext uri="{BB962C8B-B14F-4D97-AF65-F5344CB8AC3E}">
         <p14:creationId xmlns:p14="http://schemas.microsoft.com/office/powerpoint/2010/main" val="1734190857"/>
-      </p:ext>
-    </p:extLst>
-  </p:cSld>
-  <p:clrMapOvr>
-    <a:masterClrMapping/>
-  </p:clrMapOvr>
-</p:sld>
-</file>
-
-<file path=ppt/slides/slide9.xml><?xml version="1.0" encoding="utf-8"?>
-<p:sld xmlns:a="http://schemas.openxmlformats.org/drawingml/2006/main" xmlns:r="http://schemas.openxmlformats.org/officeDocument/2006/relationships" xmlns:p="http://schemas.openxmlformats.org/presentationml/2006/main">
-  <p:cSld>
-    <p:spTree>
-      <p:nvGrpSpPr>
-        <p:cNvPr id="1" name=""/>
-        <p:cNvGrpSpPr/>
-        <p:nvPr/>
-      </p:nvGrpSpPr>
-      <p:grpSpPr>
-        <a:xfrm>
-          <a:off x="0" y="0"/>
-          <a:ext cx="0" cy="0"/>
-          <a:chOff x="0" y="0"/>
-          <a:chExt cx="0" cy="0"/>
-        </a:xfrm>
-      </p:grpSpPr>
-      <p:sp>
-        <p:nvSpPr>
-          <p:cNvPr id="2" name="Titel 1"/>
-          <p:cNvSpPr>
-            <a:spLocks noGrp="1"/>
-          </p:cNvSpPr>
-          <p:nvPr>
-            <p:ph type="title"/>
-          </p:nvPr>
-        </p:nvSpPr>
-        <p:spPr/>
-        <p:txBody>
-          <a:bodyPr>
-            <a:normAutofit/>
-          </a:bodyPr>
-          <a:lstStyle/>
-          <a:p>
-            <a:r>
-              <a:rPr lang="en-GB" dirty="0"/>
-              <a:t>Definition</a:t>
-            </a:r>
-          </a:p>
-        </p:txBody>
-      </p:sp>
-      <p:sp>
-        <p:nvSpPr>
-          <p:cNvPr id="4" name="Datumsplatzhalter 3"/>
-          <p:cNvSpPr>
-            <a:spLocks noGrp="1"/>
-          </p:cNvSpPr>
-          <p:nvPr>
-            <p:ph type="dt" sz="half" idx="10"/>
-          </p:nvPr>
-        </p:nvSpPr>
-        <p:spPr/>
-        <p:txBody>
-          <a:bodyPr/>
-          <a:lstStyle/>
-          <a:p>
-            <a:r>
-              <a:rPr lang="en-US"/>
-              <a:t>Ganiyu Ibraheem   Philipp Seybold </a:t>
-            </a:r>
-            <a:endParaRPr lang="en-GB" dirty="0"/>
-          </a:p>
-        </p:txBody>
-      </p:sp>
-      <p:sp>
-        <p:nvSpPr>
-          <p:cNvPr id="5" name="Fußzeilenplatzhalter 4"/>
-          <p:cNvSpPr>
-            <a:spLocks noGrp="1"/>
-          </p:cNvSpPr>
-          <p:nvPr>
-            <p:ph type="ftr" sz="quarter" idx="11"/>
-          </p:nvPr>
-        </p:nvSpPr>
-        <p:spPr/>
-        <p:txBody>
-          <a:bodyPr/>
-          <a:lstStyle/>
-          <a:p>
-            <a:r>
-              <a:rPr lang="en-GB"/>
-              <a:t>COMP6206 Advanced Computer Vision</a:t>
-            </a:r>
-          </a:p>
-        </p:txBody>
-      </p:sp>
-      <p:sp>
-        <p:nvSpPr>
-          <p:cNvPr id="6" name="Foliennummernplatzhalter 5"/>
-          <p:cNvSpPr>
-            <a:spLocks noGrp="1"/>
-          </p:cNvSpPr>
-          <p:nvPr>
-            <p:ph type="sldNum" sz="quarter" idx="12"/>
-          </p:nvPr>
-        </p:nvSpPr>
-        <p:spPr/>
-        <p:txBody>
-          <a:bodyPr/>
-          <a:lstStyle/>
-          <a:p>
-            <a:fld id="{FB9D3F8E-99BC-4812-95D4-548B8E992B94}" type="slidenum">
-              <a:rPr lang="en-GB" smtClean="0"/>
-              <a:t>9</a:t>
-            </a:fld>
-            <a:endParaRPr lang="en-GB"/>
-          </a:p>
-        </p:txBody>
-      </p:sp>
-      <p:sp>
-        <p:nvSpPr>
-          <p:cNvPr id="7" name="Inhaltsplatzhalter 2"/>
-          <p:cNvSpPr txBox="1">
-            <a:spLocks/>
-          </p:cNvSpPr>
-          <p:nvPr/>
-        </p:nvSpPr>
-        <p:spPr>
-          <a:xfrm>
-            <a:off x="628650" y="1213872"/>
-            <a:ext cx="7886700" cy="4645152"/>
-          </a:xfrm>
-          <a:prstGeom prst="rect">
-            <a:avLst/>
-          </a:prstGeom>
-        </p:spPr>
-        <p:txBody>
-          <a:bodyPr vert="horz" lIns="91440" tIns="45720" rIns="91440" bIns="45720" rtlCol="0">
-            <a:normAutofit/>
-          </a:bodyPr>
-          <a:lstStyle>
-            <a:lvl1pPr marL="228600" indent="-228600" algn="l" defTabSz="914400" rtl="0" eaLnBrk="1" latinLnBrk="0" hangingPunct="1">
-              <a:lnSpc>
-                <a:spcPct val="90000"/>
-              </a:lnSpc>
-              <a:spcBef>
-                <a:spcPts val="1000"/>
-              </a:spcBef>
-              <a:spcAft>
-                <a:spcPts val="600"/>
-              </a:spcAft>
-              <a:buFont typeface="Arial" panose="020B0604020202020204" pitchFamily="34" charset="0"/>
-              <a:buChar char="•"/>
-              <a:defRPr sz="2800" kern="1200">
-                <a:solidFill>
-                  <a:schemeClr val="tx1"/>
-                </a:solidFill>
-                <a:latin typeface="+mn-lt"/>
-                <a:ea typeface="+mn-ea"/>
-                <a:cs typeface="+mn-cs"/>
-              </a:defRPr>
-            </a:lvl1pPr>
-            <a:lvl2pPr marL="685800" indent="-228600" algn="l" defTabSz="914400" rtl="0" eaLnBrk="1" latinLnBrk="0" hangingPunct="1">
-              <a:lnSpc>
-                <a:spcPct val="90000"/>
-              </a:lnSpc>
-              <a:spcBef>
-                <a:spcPts val="500"/>
-              </a:spcBef>
-              <a:spcAft>
-                <a:spcPts val="0"/>
-              </a:spcAft>
-              <a:buFont typeface="Arial" panose="020B0604020202020204" pitchFamily="34" charset="0"/>
-              <a:buChar char="•"/>
-              <a:defRPr sz="2400" kern="1200">
-                <a:solidFill>
-                  <a:schemeClr val="tx1"/>
-                </a:solidFill>
-                <a:latin typeface="+mn-lt"/>
-                <a:ea typeface="+mn-ea"/>
-                <a:cs typeface="+mn-cs"/>
-              </a:defRPr>
-            </a:lvl2pPr>
-            <a:lvl3pPr marL="1143000" indent="-228600" algn="l" defTabSz="914400" rtl="0" eaLnBrk="1" latinLnBrk="0" hangingPunct="1">
-              <a:lnSpc>
-                <a:spcPct val="90000"/>
-              </a:lnSpc>
-              <a:spcBef>
-                <a:spcPts val="500"/>
-              </a:spcBef>
-              <a:spcAft>
-                <a:spcPts val="0"/>
-              </a:spcAft>
-              <a:buFont typeface="Arial" panose="020B0604020202020204" pitchFamily="34" charset="0"/>
-              <a:buChar char="•"/>
-              <a:defRPr sz="2000" kern="1200">
-                <a:solidFill>
-                  <a:schemeClr val="tx1"/>
-                </a:solidFill>
-                <a:latin typeface="+mn-lt"/>
-                <a:ea typeface="+mn-ea"/>
-                <a:cs typeface="+mn-cs"/>
-              </a:defRPr>
-            </a:lvl3pPr>
-            <a:lvl4pPr marL="1600200" indent="-228600" algn="l" defTabSz="914400" rtl="0" eaLnBrk="1" latinLnBrk="0" hangingPunct="1">
-              <a:lnSpc>
-                <a:spcPct val="90000"/>
-              </a:lnSpc>
-              <a:spcBef>
-                <a:spcPts val="500"/>
-              </a:spcBef>
-              <a:spcAft>
-                <a:spcPts val="0"/>
-              </a:spcAft>
-              <a:buFont typeface="Arial" panose="020B0604020202020204" pitchFamily="34" charset="0"/>
-              <a:buChar char="•"/>
-              <a:defRPr sz="1800" kern="1200">
-                <a:solidFill>
-                  <a:schemeClr val="tx1"/>
-                </a:solidFill>
-                <a:latin typeface="+mn-lt"/>
-                <a:ea typeface="+mn-ea"/>
-                <a:cs typeface="+mn-cs"/>
-              </a:defRPr>
-            </a:lvl4pPr>
-            <a:lvl5pPr marL="2057400" indent="-228600" algn="l" defTabSz="914400" rtl="0" eaLnBrk="1" latinLnBrk="0" hangingPunct="1">
-              <a:lnSpc>
-                <a:spcPct val="90000"/>
-              </a:lnSpc>
-              <a:spcBef>
-                <a:spcPts val="500"/>
-              </a:spcBef>
-              <a:spcAft>
-                <a:spcPts val="0"/>
-              </a:spcAft>
-              <a:buFont typeface="Arial" panose="020B0604020202020204" pitchFamily="34" charset="0"/>
-              <a:buChar char="•"/>
-              <a:defRPr sz="1800" kern="1200">
-                <a:solidFill>
-                  <a:schemeClr val="tx1"/>
-                </a:solidFill>
-                <a:latin typeface="+mn-lt"/>
-                <a:ea typeface="+mn-ea"/>
-                <a:cs typeface="+mn-cs"/>
-              </a:defRPr>
-            </a:lvl5pPr>
-            <a:lvl6pPr marL="2514600" indent="-228600" algn="l" defTabSz="914400" rtl="0" eaLnBrk="1" latinLnBrk="0" hangingPunct="1">
-              <a:lnSpc>
-                <a:spcPct val="90000"/>
-              </a:lnSpc>
-              <a:spcBef>
-                <a:spcPts val="500"/>
-              </a:spcBef>
-              <a:buFont typeface="Arial" panose="020B0604020202020204" pitchFamily="34" charset="0"/>
-              <a:buChar char="•"/>
-              <a:defRPr sz="1800" kern="1200">
-                <a:solidFill>
-                  <a:schemeClr val="tx1"/>
-                </a:solidFill>
-                <a:latin typeface="+mn-lt"/>
-                <a:ea typeface="+mn-ea"/>
-                <a:cs typeface="+mn-cs"/>
-              </a:defRPr>
-            </a:lvl6pPr>
-            <a:lvl7pPr marL="2971800" indent="-228600" algn="l" defTabSz="914400" rtl="0" eaLnBrk="1" latinLnBrk="0" hangingPunct="1">
-              <a:lnSpc>
-                <a:spcPct val="90000"/>
-              </a:lnSpc>
-              <a:spcBef>
-                <a:spcPts val="500"/>
-              </a:spcBef>
-              <a:buFont typeface="Arial" panose="020B0604020202020204" pitchFamily="34" charset="0"/>
-              <a:buChar char="•"/>
-              <a:defRPr sz="1800" kern="1200">
-                <a:solidFill>
-                  <a:schemeClr val="tx1"/>
-                </a:solidFill>
-                <a:latin typeface="+mn-lt"/>
-                <a:ea typeface="+mn-ea"/>
-                <a:cs typeface="+mn-cs"/>
-              </a:defRPr>
-            </a:lvl7pPr>
-            <a:lvl8pPr marL="3429000" indent="-228600" algn="l" defTabSz="914400" rtl="0" eaLnBrk="1" latinLnBrk="0" hangingPunct="1">
-              <a:lnSpc>
-                <a:spcPct val="90000"/>
-              </a:lnSpc>
-              <a:spcBef>
-                <a:spcPts val="500"/>
-              </a:spcBef>
-              <a:buFont typeface="Arial" panose="020B0604020202020204" pitchFamily="34" charset="0"/>
-              <a:buChar char="•"/>
-              <a:defRPr sz="1800" kern="1200">
-                <a:solidFill>
-                  <a:schemeClr val="tx1"/>
-                </a:solidFill>
-                <a:latin typeface="+mn-lt"/>
-                <a:ea typeface="+mn-ea"/>
-                <a:cs typeface="+mn-cs"/>
-              </a:defRPr>
-            </a:lvl8pPr>
-            <a:lvl9pPr marL="3886200" indent="-228600" algn="l" defTabSz="914400" rtl="0" eaLnBrk="1" latinLnBrk="0" hangingPunct="1">
-              <a:lnSpc>
-                <a:spcPct val="90000"/>
-              </a:lnSpc>
-              <a:spcBef>
-                <a:spcPts val="500"/>
-              </a:spcBef>
-              <a:buFont typeface="Arial" panose="020B0604020202020204" pitchFamily="34" charset="0"/>
-              <a:buChar char="•"/>
-              <a:defRPr sz="1800" kern="1200">
-                <a:solidFill>
-                  <a:schemeClr val="tx1"/>
-                </a:solidFill>
-                <a:latin typeface="+mn-lt"/>
-                <a:ea typeface="+mn-ea"/>
-                <a:cs typeface="+mn-cs"/>
-              </a:defRPr>
-            </a:lvl9pPr>
-          </a:lstStyle>
-          <a:p>
-            <a:r>
-              <a:rPr lang="en-GB" dirty="0"/>
-              <a:t>Ordinal Measures (OM)</a:t>
-            </a:r>
-          </a:p>
-          <a:p>
-            <a:pPr lvl="1"/>
-            <a:r>
-              <a:rPr lang="en-GB" dirty="0"/>
-              <a:t>Relative ordering of variables</a:t>
-            </a:r>
-          </a:p>
-          <a:p>
-            <a:pPr lvl="1"/>
-            <a:r>
-              <a:rPr lang="en-GB" dirty="0"/>
-              <a:t>For intensity or feature level</a:t>
-            </a:r>
-            <a:br>
-              <a:rPr lang="en-GB" dirty="0"/>
-            </a:br>
-            <a:r>
-              <a:rPr lang="en-GB" dirty="0"/>
-              <a:t>(Gabor features)</a:t>
-            </a:r>
-            <a:br>
-              <a:rPr lang="en-GB" dirty="0"/>
-            </a:br>
-            <a:endParaRPr lang="en-GB" dirty="0"/>
-          </a:p>
-          <a:p>
-            <a:r>
-              <a:rPr lang="en-GB" dirty="0"/>
-              <a:t>Advantages in computer vision:</a:t>
-            </a:r>
-          </a:p>
-          <a:p>
-            <a:pPr lvl="1"/>
-            <a:r>
-              <a:rPr lang="en-GB" dirty="0"/>
-              <a:t>Invariance to monotonic illumination changes </a:t>
-            </a:r>
-          </a:p>
-          <a:p>
-            <a:pPr lvl="1"/>
-            <a:r>
-              <a:rPr lang="en-GB" dirty="0"/>
-              <a:t>Robustness against noise</a:t>
-            </a:r>
-          </a:p>
-          <a:p>
-            <a:pPr lvl="1"/>
-            <a:r>
-              <a:rPr lang="en-GB" dirty="0"/>
-              <a:t>Useful for recognition tasks</a:t>
-            </a:r>
-          </a:p>
-        </p:txBody>
-      </p:sp>
-      <p:pic>
-        <p:nvPicPr>
-          <p:cNvPr id="3" name="Grafik 2"/>
-          <p:cNvPicPr>
-            <a:picLocks noChangeAspect="1"/>
-          </p:cNvPicPr>
-          <p:nvPr/>
-        </p:nvPicPr>
-        <p:blipFill rotWithShape="1">
-          <a:blip r:embed="rId3"/>
-          <a:srcRect l="14121" t="6946" r="10566" b="4244"/>
-          <a:stretch/>
-        </p:blipFill>
-        <p:spPr>
-          <a:xfrm>
-            <a:off x="5557520" y="914399"/>
-            <a:ext cx="2957830" cy="2584209"/>
-          </a:xfrm>
-          <a:prstGeom prst="rect">
-            <a:avLst/>
-          </a:prstGeom>
-        </p:spPr>
-      </p:pic>
-    </p:spTree>
-    <p:extLst>
-      <p:ext uri="{BB962C8B-B14F-4D97-AF65-F5344CB8AC3E}">
-        <p14:creationId xmlns:p14="http://schemas.microsoft.com/office/powerpoint/2010/main" val="3568274174"/>
       </p:ext>
     </p:extLst>
   </p:cSld>

</xml_diff>